<commit_message>
Assignment submission Isabelle Butterfield
</commit_message>
<xml_diff>
--- a/lectures/01 - REST and docker.pptx
+++ b/lectures/01 - REST and docker.pptx
@@ -574,7 +574,7 @@
           <a:p>
             <a:fld id="{B30C5654-8255-4741-B5E4-F40A45C3546B}" type="datetimeFigureOut">
               <a:rPr lang="en-US" smtClean="0"/>
-              <a:t>1/15/19</a:t>
+              <a:t>1/16/19</a:t>
             </a:fld>
             <a:endParaRPr lang="en-US"/>
           </a:p>
@@ -1572,6 +1572,922 @@
 </p:notes>
 </file>
 
+<file path=ppt/notesSlides/notesSlide5.xml><?xml version="1.0" encoding="utf-8"?>
+<p:notes xmlns:a="http://schemas.openxmlformats.org/drawingml/2006/main" xmlns:r="http://schemas.openxmlformats.org/officeDocument/2006/relationships" xmlns:p="http://schemas.openxmlformats.org/presentationml/2006/main">
+  <p:cSld>
+    <p:spTree>
+      <p:nvGrpSpPr>
+        <p:cNvPr id="1" name=""/>
+        <p:cNvGrpSpPr/>
+        <p:nvPr/>
+      </p:nvGrpSpPr>
+      <p:grpSpPr>
+        <a:xfrm>
+          <a:off x="0" y="0"/>
+          <a:ext cx="0" cy="0"/>
+          <a:chOff x="0" y="0"/>
+          <a:chExt cx="0" cy="0"/>
+        </a:xfrm>
+      </p:grpSpPr>
+      <p:sp>
+        <p:nvSpPr>
+          <p:cNvPr id="2" name="Slide Image Placeholder 1"/>
+          <p:cNvSpPr>
+            <a:spLocks noGrp="1" noRot="1" noChangeAspect="1"/>
+          </p:cNvSpPr>
+          <p:nvPr>
+            <p:ph type="sldImg"/>
+          </p:nvPr>
+        </p:nvSpPr>
+        <p:spPr/>
+      </p:sp>
+      <p:sp>
+        <p:nvSpPr>
+          <p:cNvPr id="3" name="Notes Placeholder 2"/>
+          <p:cNvSpPr>
+            <a:spLocks noGrp="1"/>
+          </p:cNvSpPr>
+          <p:nvPr>
+            <p:ph type="body" idx="1"/>
+          </p:nvPr>
+        </p:nvSpPr>
+        <p:spPr/>
+        <p:txBody>
+          <a:bodyPr/>
+          <a:lstStyle/>
+          <a:p>
+            <a:pPr marL="0" marR="0" lvl="0" indent="0" algn="l" defTabSz="914400" rtl="0" eaLnBrk="1" fontAlgn="auto" latinLnBrk="0" hangingPunct="1">
+              <a:lnSpc>
+                <a:spcPct val="100000"/>
+              </a:lnSpc>
+              <a:spcBef>
+                <a:spcPts val="0"/>
+              </a:spcBef>
+              <a:spcAft>
+                <a:spcPts val="0"/>
+              </a:spcAft>
+              <a:buClrTx/>
+              <a:buSzTx/>
+              <a:buFontTx/>
+              <a:buNone/>
+              <a:tabLst/>
+              <a:defRPr/>
+            </a:pPr>
+            <a:r>
+              <a:rPr lang="en-US" sz="1200" kern="1200" dirty="0">
+                <a:solidFill>
+                  <a:schemeClr val="tx1"/>
+                </a:solidFill>
+                <a:effectLst/>
+                <a:latin typeface="+mn-lt"/>
+                <a:ea typeface="+mn-ea"/>
+                <a:cs typeface="+mn-cs"/>
+              </a:rPr>
+              <a:t>curl http://localhost:5000/timesheets-X GET --dump-header -</a:t>
+            </a:r>
+          </a:p>
+          <a:p>
+            <a:endParaRPr lang="en-US" dirty="0"/>
+          </a:p>
+        </p:txBody>
+      </p:sp>
+      <p:sp>
+        <p:nvSpPr>
+          <p:cNvPr id="4" name="Slide Number Placeholder 3"/>
+          <p:cNvSpPr>
+            <a:spLocks noGrp="1"/>
+          </p:cNvSpPr>
+          <p:nvPr>
+            <p:ph type="sldNum" sz="quarter" idx="10"/>
+          </p:nvPr>
+        </p:nvSpPr>
+        <p:spPr/>
+        <p:txBody>
+          <a:bodyPr/>
+          <a:lstStyle/>
+          <a:p>
+            <a:fld id="{E58294B0-43FA-4697-A94A-C7D8A3CEE26B}" type="slidenum">
+              <a:rPr lang="en-US" smtClean="0"/>
+              <a:t>15</a:t>
+            </a:fld>
+            <a:endParaRPr lang="en-US"/>
+          </a:p>
+        </p:txBody>
+      </p:sp>
+    </p:spTree>
+    <p:extLst>
+      <p:ext uri="{BB962C8B-B14F-4D97-AF65-F5344CB8AC3E}">
+        <p14:creationId xmlns:p14="http://schemas.microsoft.com/office/powerpoint/2010/main" val="3467766240"/>
+      </p:ext>
+    </p:extLst>
+  </p:cSld>
+  <p:clrMapOvr>
+    <a:masterClrMapping/>
+  </p:clrMapOvr>
+</p:notes>
+</file>
+
+<file path=ppt/notesSlides/notesSlide6.xml><?xml version="1.0" encoding="utf-8"?>
+<p:notes xmlns:a="http://schemas.openxmlformats.org/drawingml/2006/main" xmlns:r="http://schemas.openxmlformats.org/officeDocument/2006/relationships" xmlns:p="http://schemas.openxmlformats.org/presentationml/2006/main">
+  <p:cSld>
+    <p:spTree>
+      <p:nvGrpSpPr>
+        <p:cNvPr id="1" name=""/>
+        <p:cNvGrpSpPr/>
+        <p:nvPr/>
+      </p:nvGrpSpPr>
+      <p:grpSpPr>
+        <a:xfrm>
+          <a:off x="0" y="0"/>
+          <a:ext cx="0" cy="0"/>
+          <a:chOff x="0" y="0"/>
+          <a:chExt cx="0" cy="0"/>
+        </a:xfrm>
+      </p:grpSpPr>
+      <p:sp>
+        <p:nvSpPr>
+          <p:cNvPr id="2" name="Slide Image Placeholder 1"/>
+          <p:cNvSpPr>
+            <a:spLocks noGrp="1" noRot="1" noChangeAspect="1"/>
+          </p:cNvSpPr>
+          <p:nvPr>
+            <p:ph type="sldImg"/>
+          </p:nvPr>
+        </p:nvSpPr>
+        <p:spPr/>
+      </p:sp>
+      <p:sp>
+        <p:nvSpPr>
+          <p:cNvPr id="3" name="Notes Placeholder 2"/>
+          <p:cNvSpPr>
+            <a:spLocks noGrp="1"/>
+          </p:cNvSpPr>
+          <p:nvPr>
+            <p:ph type="body" idx="1"/>
+          </p:nvPr>
+        </p:nvSpPr>
+        <p:spPr/>
+        <p:txBody>
+          <a:bodyPr/>
+          <a:lstStyle/>
+          <a:p>
+            <a:pPr marL="0" marR="0" lvl="0" indent="0" algn="l" defTabSz="914400" rtl="0" eaLnBrk="1" fontAlgn="auto" latinLnBrk="0" hangingPunct="1">
+              <a:lnSpc>
+                <a:spcPct val="100000"/>
+              </a:lnSpc>
+              <a:spcBef>
+                <a:spcPts val="0"/>
+              </a:spcBef>
+              <a:spcAft>
+                <a:spcPts val="0"/>
+              </a:spcAft>
+              <a:buClrTx/>
+              <a:buSzTx/>
+              <a:buFontTx/>
+              <a:buNone/>
+              <a:tabLst/>
+              <a:defRPr/>
+            </a:pPr>
+            <a:r>
+              <a:rPr lang="en-US" sz="1200" kern="1200" dirty="0">
+                <a:solidFill>
+                  <a:schemeClr val="tx1"/>
+                </a:solidFill>
+                <a:effectLst/>
+                <a:latin typeface="+mn-lt"/>
+                <a:ea typeface="+mn-ea"/>
+                <a:cs typeface="+mn-cs"/>
+              </a:rPr>
+              <a:t>curl -H "Accept: application/</a:t>
+            </a:r>
+            <a:r>
+              <a:rPr lang="en-US" sz="1200" kern="1200" dirty="0" err="1">
+                <a:solidFill>
+                  <a:schemeClr val="tx1"/>
+                </a:solidFill>
+                <a:effectLst/>
+                <a:latin typeface="+mn-lt"/>
+                <a:ea typeface="+mn-ea"/>
+                <a:cs typeface="+mn-cs"/>
+              </a:rPr>
+              <a:t>foo.timesheet-line+json</a:t>
+            </a:r>
+            <a:r>
+              <a:rPr lang="en-US" sz="1200" kern="1200" dirty="0">
+                <a:solidFill>
+                  <a:schemeClr val="tx1"/>
+                </a:solidFill>
+                <a:effectLst/>
+                <a:latin typeface="+mn-lt"/>
+                <a:ea typeface="+mn-ea"/>
+                <a:cs typeface="+mn-cs"/>
+              </a:rPr>
+              <a:t>" -H "Content-Type: application/</a:t>
+            </a:r>
+            <a:r>
+              <a:rPr lang="en-US" sz="1200" kern="1200" dirty="0" err="1">
+                <a:solidFill>
+                  <a:schemeClr val="tx1"/>
+                </a:solidFill>
+                <a:effectLst/>
+                <a:latin typeface="+mn-lt"/>
+                <a:ea typeface="+mn-ea"/>
+                <a:cs typeface="+mn-cs"/>
+              </a:rPr>
+              <a:t>json</a:t>
+            </a:r>
+            <a:r>
+              <a:rPr lang="en-US" sz="1200" kern="1200" dirty="0">
+                <a:solidFill>
+                  <a:schemeClr val="tx1"/>
+                </a:solidFill>
+                <a:effectLst/>
+                <a:latin typeface="+mn-lt"/>
+                <a:ea typeface="+mn-ea"/>
+                <a:cs typeface="+mn-cs"/>
+              </a:rPr>
+              <a:t>" -H "X-Requested-With: </a:t>
+            </a:r>
+            <a:r>
+              <a:rPr lang="en-US" sz="1200" kern="1200" dirty="0" err="1">
+                <a:solidFill>
+                  <a:schemeClr val="tx1"/>
+                </a:solidFill>
+                <a:effectLst/>
+                <a:latin typeface="+mn-lt"/>
+                <a:ea typeface="+mn-ea"/>
+                <a:cs typeface="+mn-cs"/>
+              </a:rPr>
+              <a:t>XMLHttpRequest</a:t>
+            </a:r>
+            <a:r>
+              <a:rPr lang="en-US" sz="1200" kern="1200" dirty="0">
+                <a:solidFill>
+                  <a:schemeClr val="tx1"/>
+                </a:solidFill>
+                <a:effectLst/>
+                <a:latin typeface="+mn-lt"/>
+                <a:ea typeface="+mn-ea"/>
+                <a:cs typeface="+mn-cs"/>
+              </a:rPr>
+              <a:t>" -X POST -d '{"resource": 1}' http://localhost:5000/timesheets --dump-header -</a:t>
+            </a:r>
+          </a:p>
+          <a:p>
+            <a:endParaRPr lang="en-US" dirty="0"/>
+          </a:p>
+        </p:txBody>
+      </p:sp>
+      <p:sp>
+        <p:nvSpPr>
+          <p:cNvPr id="4" name="Slide Number Placeholder 3"/>
+          <p:cNvSpPr>
+            <a:spLocks noGrp="1"/>
+          </p:cNvSpPr>
+          <p:nvPr>
+            <p:ph type="sldNum" sz="quarter" idx="10"/>
+          </p:nvPr>
+        </p:nvSpPr>
+        <p:spPr/>
+        <p:txBody>
+          <a:bodyPr/>
+          <a:lstStyle/>
+          <a:p>
+            <a:fld id="{E58294B0-43FA-4697-A94A-C7D8A3CEE26B}" type="slidenum">
+              <a:rPr lang="en-US" smtClean="0"/>
+              <a:t>16</a:t>
+            </a:fld>
+            <a:endParaRPr lang="en-US"/>
+          </a:p>
+        </p:txBody>
+      </p:sp>
+    </p:spTree>
+    <p:extLst>
+      <p:ext uri="{BB962C8B-B14F-4D97-AF65-F5344CB8AC3E}">
+        <p14:creationId xmlns:p14="http://schemas.microsoft.com/office/powerpoint/2010/main" val="3681118289"/>
+      </p:ext>
+    </p:extLst>
+  </p:cSld>
+  <p:clrMapOvr>
+    <a:masterClrMapping/>
+  </p:clrMapOvr>
+</p:notes>
+</file>
+
+<file path=ppt/notesSlides/notesSlide7.xml><?xml version="1.0" encoding="utf-8"?>
+<p:notes xmlns:a="http://schemas.openxmlformats.org/drawingml/2006/main" xmlns:r="http://schemas.openxmlformats.org/officeDocument/2006/relationships" xmlns:p="http://schemas.openxmlformats.org/presentationml/2006/main">
+  <p:cSld>
+    <p:spTree>
+      <p:nvGrpSpPr>
+        <p:cNvPr id="1" name=""/>
+        <p:cNvGrpSpPr/>
+        <p:nvPr/>
+      </p:nvGrpSpPr>
+      <p:grpSpPr>
+        <a:xfrm>
+          <a:off x="0" y="0"/>
+          <a:ext cx="0" cy="0"/>
+          <a:chOff x="0" y="0"/>
+          <a:chExt cx="0" cy="0"/>
+        </a:xfrm>
+      </p:grpSpPr>
+      <p:sp>
+        <p:nvSpPr>
+          <p:cNvPr id="2" name="Slide Image Placeholder 1"/>
+          <p:cNvSpPr>
+            <a:spLocks noGrp="1" noRot="1" noChangeAspect="1"/>
+          </p:cNvSpPr>
+          <p:nvPr>
+            <p:ph type="sldImg"/>
+          </p:nvPr>
+        </p:nvSpPr>
+        <p:spPr/>
+      </p:sp>
+      <p:sp>
+        <p:nvSpPr>
+          <p:cNvPr id="3" name="Notes Placeholder 2"/>
+          <p:cNvSpPr>
+            <a:spLocks noGrp="1"/>
+          </p:cNvSpPr>
+          <p:nvPr>
+            <p:ph type="body" idx="1"/>
+          </p:nvPr>
+        </p:nvSpPr>
+        <p:spPr/>
+        <p:txBody>
+          <a:bodyPr/>
+          <a:lstStyle/>
+          <a:p>
+            <a:pPr marL="0" marR="0" lvl="0" indent="0" algn="l" defTabSz="914400" rtl="0" eaLnBrk="1" fontAlgn="auto" latinLnBrk="0" hangingPunct="1">
+              <a:lnSpc>
+                <a:spcPct val="100000"/>
+              </a:lnSpc>
+              <a:spcBef>
+                <a:spcPts val="0"/>
+              </a:spcBef>
+              <a:spcAft>
+                <a:spcPts val="0"/>
+              </a:spcAft>
+              <a:buClrTx/>
+              <a:buSzTx/>
+              <a:buFontTx/>
+              <a:buNone/>
+              <a:tabLst/>
+              <a:defRPr/>
+            </a:pPr>
+            <a:r>
+              <a:rPr lang="en-US" sz="1200" kern="1200" dirty="0">
+                <a:solidFill>
+                  <a:schemeClr val="tx1"/>
+                </a:solidFill>
+                <a:effectLst/>
+                <a:latin typeface="+mn-lt"/>
+                <a:ea typeface="+mn-ea"/>
+                <a:cs typeface="+mn-cs"/>
+              </a:rPr>
+              <a:t>curl -H "Accept: application/</a:t>
+            </a:r>
+            <a:r>
+              <a:rPr lang="en-US" sz="1200" kern="1200" dirty="0" err="1">
+                <a:solidFill>
+                  <a:schemeClr val="tx1"/>
+                </a:solidFill>
+                <a:effectLst/>
+                <a:latin typeface="+mn-lt"/>
+                <a:ea typeface="+mn-ea"/>
+                <a:cs typeface="+mn-cs"/>
+              </a:rPr>
+              <a:t>foo.timesheet-line+json</a:t>
+            </a:r>
+            <a:r>
+              <a:rPr lang="en-US" sz="1200" kern="1200" dirty="0">
+                <a:solidFill>
+                  <a:schemeClr val="tx1"/>
+                </a:solidFill>
+                <a:effectLst/>
+                <a:latin typeface="+mn-lt"/>
+                <a:ea typeface="+mn-ea"/>
+                <a:cs typeface="+mn-cs"/>
+              </a:rPr>
+              <a:t>" -H "Content-Type: application/</a:t>
+            </a:r>
+            <a:r>
+              <a:rPr lang="en-US" sz="1200" kern="1200" dirty="0" err="1">
+                <a:solidFill>
+                  <a:schemeClr val="tx1"/>
+                </a:solidFill>
+                <a:effectLst/>
+                <a:latin typeface="+mn-lt"/>
+                <a:ea typeface="+mn-ea"/>
+                <a:cs typeface="+mn-cs"/>
+              </a:rPr>
+              <a:t>json</a:t>
+            </a:r>
+            <a:r>
+              <a:rPr lang="en-US" sz="1200" kern="1200" dirty="0">
+                <a:solidFill>
+                  <a:schemeClr val="tx1"/>
+                </a:solidFill>
+                <a:effectLst/>
+                <a:latin typeface="+mn-lt"/>
+                <a:ea typeface="+mn-ea"/>
+                <a:cs typeface="+mn-cs"/>
+              </a:rPr>
+              <a:t>" -H "X-Requested-With: </a:t>
+            </a:r>
+            <a:r>
+              <a:rPr lang="en-US" sz="1200" kern="1200" dirty="0" err="1">
+                <a:solidFill>
+                  <a:schemeClr val="tx1"/>
+                </a:solidFill>
+                <a:effectLst/>
+                <a:latin typeface="+mn-lt"/>
+                <a:ea typeface="+mn-ea"/>
+                <a:cs typeface="+mn-cs"/>
+              </a:rPr>
+              <a:t>XMLHttpRequest</a:t>
+            </a:r>
+            <a:r>
+              <a:rPr lang="en-US" sz="1200" kern="1200" dirty="0">
+                <a:solidFill>
+                  <a:schemeClr val="tx1"/>
+                </a:solidFill>
+                <a:effectLst/>
+                <a:latin typeface="+mn-lt"/>
+                <a:ea typeface="+mn-ea"/>
+                <a:cs typeface="+mn-cs"/>
+              </a:rPr>
+              <a:t>" -X POST -d '{"week": 2, "year": 2012, "day": "</a:t>
+            </a:r>
+            <a:r>
+              <a:rPr lang="en-US" sz="1200" kern="1200" dirty="0" err="1">
+                <a:solidFill>
+                  <a:schemeClr val="tx1"/>
+                </a:solidFill>
+                <a:effectLst/>
+                <a:latin typeface="+mn-lt"/>
+                <a:ea typeface="+mn-ea"/>
+                <a:cs typeface="+mn-cs"/>
+              </a:rPr>
+              <a:t>thursday</a:t>
+            </a:r>
+            <a:r>
+              <a:rPr lang="en-US" sz="1200" kern="1200" dirty="0">
+                <a:solidFill>
+                  <a:schemeClr val="tx1"/>
+                </a:solidFill>
+                <a:effectLst/>
+                <a:latin typeface="+mn-lt"/>
+                <a:ea typeface="+mn-ea"/>
+                <a:cs typeface="+mn-cs"/>
+              </a:rPr>
+              <a:t>", "hours": 8, "project": "project"}' http://localhost:5000/timesheets/dat-1547654109/lines --dump-header -</a:t>
+            </a:r>
+          </a:p>
+          <a:p>
+            <a:endParaRPr lang="en-US" dirty="0"/>
+          </a:p>
+          <a:p>
+            <a:endParaRPr lang="en-US" dirty="0"/>
+          </a:p>
+          <a:p>
+            <a:r>
+              <a:rPr lang="en-US" dirty="0"/>
+              <a:t>public bool </a:t>
+            </a:r>
+            <a:r>
+              <a:rPr lang="en-US" dirty="0" err="1"/>
+              <a:t>DoesLineExist</a:t>
+            </a:r>
+            <a:r>
+              <a:rPr lang="en-US" dirty="0"/>
+              <a:t>(</a:t>
+            </a:r>
+            <a:r>
+              <a:rPr lang="en-US" dirty="0" err="1"/>
+              <a:t>Guid</a:t>
+            </a:r>
+            <a:r>
+              <a:rPr lang="en-US" dirty="0"/>
+              <a:t> </a:t>
+            </a:r>
+            <a:r>
+              <a:rPr lang="en-US" dirty="0" err="1"/>
+              <a:t>lineID</a:t>
+            </a:r>
+            <a:r>
+              <a:rPr lang="en-US" dirty="0"/>
+              <a:t>)</a:t>
+            </a:r>
+          </a:p>
+          <a:p>
+            <a:r>
+              <a:rPr lang="en-US" dirty="0"/>
+              <a:t>        {</a:t>
+            </a:r>
+          </a:p>
+          <a:p>
+            <a:r>
+              <a:rPr lang="en-US" dirty="0"/>
+              <a:t>            for(</a:t>
+            </a:r>
+            <a:r>
+              <a:rPr lang="en-US" dirty="0" err="1"/>
+              <a:t>int</a:t>
+            </a:r>
+            <a:r>
+              <a:rPr lang="en-US" dirty="0"/>
+              <a:t> </a:t>
+            </a:r>
+            <a:r>
+              <a:rPr lang="en-US" dirty="0" err="1"/>
+              <a:t>i</a:t>
+            </a:r>
+            <a:r>
+              <a:rPr lang="en-US" dirty="0"/>
+              <a:t> = 0; </a:t>
+            </a:r>
+            <a:r>
+              <a:rPr lang="en-US" dirty="0" err="1"/>
+              <a:t>i</a:t>
+            </a:r>
+            <a:r>
+              <a:rPr lang="en-US" dirty="0"/>
+              <a:t> &lt; </a:t>
+            </a:r>
+            <a:r>
+              <a:rPr lang="en-US" dirty="0" err="1"/>
+              <a:t>Lines.Count</a:t>
+            </a:r>
+            <a:r>
+              <a:rPr lang="en-US" dirty="0"/>
+              <a:t>; </a:t>
+            </a:r>
+            <a:r>
+              <a:rPr lang="en-US" dirty="0" err="1"/>
+              <a:t>i</a:t>
+            </a:r>
+            <a:r>
+              <a:rPr lang="en-US" dirty="0"/>
+              <a:t>++)</a:t>
+            </a:r>
+          </a:p>
+          <a:p>
+            <a:r>
+              <a:rPr lang="en-US" dirty="0"/>
+              <a:t>            {</a:t>
+            </a:r>
+          </a:p>
+          <a:p>
+            <a:r>
+              <a:rPr lang="en-US" dirty="0"/>
+              <a:t>                if (Lines[</a:t>
+            </a:r>
+            <a:r>
+              <a:rPr lang="en-US" dirty="0" err="1"/>
+              <a:t>i</a:t>
+            </a:r>
+            <a:r>
+              <a:rPr lang="en-US" dirty="0"/>
+              <a:t>].</a:t>
+            </a:r>
+            <a:r>
+              <a:rPr lang="en-US" dirty="0" err="1"/>
+              <a:t>UniqueIdentifier</a:t>
+            </a:r>
+            <a:r>
+              <a:rPr lang="en-US" dirty="0"/>
+              <a:t> == </a:t>
+            </a:r>
+            <a:r>
+              <a:rPr lang="en-US" dirty="0" err="1"/>
+              <a:t>lineID</a:t>
+            </a:r>
+            <a:r>
+              <a:rPr lang="en-US" dirty="0"/>
+              <a:t>)</a:t>
+            </a:r>
+          </a:p>
+          <a:p>
+            <a:r>
+              <a:rPr lang="en-US" dirty="0"/>
+              <a:t>                {</a:t>
+            </a:r>
+          </a:p>
+          <a:p>
+            <a:r>
+              <a:rPr lang="en-US" dirty="0"/>
+              <a:t>                    return true;</a:t>
+            </a:r>
+          </a:p>
+          <a:p>
+            <a:r>
+              <a:rPr lang="en-US" dirty="0"/>
+              <a:t>                }</a:t>
+            </a:r>
+          </a:p>
+          <a:p>
+            <a:r>
+              <a:rPr lang="en-US" dirty="0"/>
+              <a:t>            }</a:t>
+            </a:r>
+          </a:p>
+          <a:p>
+            <a:endParaRPr lang="en-US" dirty="0"/>
+          </a:p>
+          <a:p>
+            <a:r>
+              <a:rPr lang="en-US" dirty="0"/>
+              <a:t>            return false;</a:t>
+            </a:r>
+          </a:p>
+          <a:p>
+            <a:r>
+              <a:rPr lang="en-US" dirty="0"/>
+              <a:t>        }</a:t>
+            </a:r>
+          </a:p>
+          <a:p>
+            <a:endParaRPr lang="en-US" dirty="0"/>
+          </a:p>
+          <a:p>
+            <a:r>
+              <a:rPr lang="en-US" dirty="0"/>
+              <a:t>        public void </a:t>
+            </a:r>
+            <a:r>
+              <a:rPr lang="en-US" dirty="0" err="1"/>
+              <a:t>RemoveLine</a:t>
+            </a:r>
+            <a:r>
+              <a:rPr lang="en-US" dirty="0"/>
+              <a:t>(</a:t>
+            </a:r>
+            <a:r>
+              <a:rPr lang="en-US" dirty="0" err="1"/>
+              <a:t>Guid</a:t>
+            </a:r>
+            <a:r>
+              <a:rPr lang="en-US" dirty="0"/>
+              <a:t> </a:t>
+            </a:r>
+            <a:r>
+              <a:rPr lang="en-US" dirty="0" err="1"/>
+              <a:t>lineID</a:t>
+            </a:r>
+            <a:r>
+              <a:rPr lang="en-US" dirty="0"/>
+              <a:t>)</a:t>
+            </a:r>
+          </a:p>
+          <a:p>
+            <a:r>
+              <a:rPr lang="en-US" dirty="0"/>
+              <a:t>        {</a:t>
+            </a:r>
+          </a:p>
+          <a:p>
+            <a:r>
+              <a:rPr lang="en-US" dirty="0"/>
+              <a:t>            </a:t>
+            </a:r>
+            <a:r>
+              <a:rPr lang="en-US" dirty="0" err="1"/>
+              <a:t>int</a:t>
+            </a:r>
+            <a:r>
+              <a:rPr lang="en-US" dirty="0"/>
+              <a:t> </a:t>
+            </a:r>
+            <a:r>
+              <a:rPr lang="en-US" dirty="0" err="1"/>
+              <a:t>lineIndex</a:t>
+            </a:r>
+            <a:r>
+              <a:rPr lang="en-US" dirty="0"/>
+              <a:t> = -1;</a:t>
+            </a:r>
+          </a:p>
+          <a:p>
+            <a:endParaRPr lang="en-US" dirty="0"/>
+          </a:p>
+          <a:p>
+            <a:r>
+              <a:rPr lang="en-US" dirty="0"/>
+              <a:t>            for (</a:t>
+            </a:r>
+            <a:r>
+              <a:rPr lang="en-US" dirty="0" err="1"/>
+              <a:t>int</a:t>
+            </a:r>
+            <a:r>
+              <a:rPr lang="en-US" dirty="0"/>
+              <a:t> </a:t>
+            </a:r>
+            <a:r>
+              <a:rPr lang="en-US" dirty="0" err="1"/>
+              <a:t>i</a:t>
+            </a:r>
+            <a:r>
+              <a:rPr lang="en-US" dirty="0"/>
+              <a:t> = 0; </a:t>
+            </a:r>
+            <a:r>
+              <a:rPr lang="en-US" dirty="0" err="1"/>
+              <a:t>i</a:t>
+            </a:r>
+            <a:r>
+              <a:rPr lang="en-US" dirty="0"/>
+              <a:t> &lt; </a:t>
+            </a:r>
+            <a:r>
+              <a:rPr lang="en-US" dirty="0" err="1"/>
+              <a:t>Lines.Count</a:t>
+            </a:r>
+            <a:r>
+              <a:rPr lang="en-US" dirty="0"/>
+              <a:t>; </a:t>
+            </a:r>
+            <a:r>
+              <a:rPr lang="en-US" dirty="0" err="1"/>
+              <a:t>i</a:t>
+            </a:r>
+            <a:r>
+              <a:rPr lang="en-US" dirty="0"/>
+              <a:t>++)</a:t>
+            </a:r>
+          </a:p>
+          <a:p>
+            <a:r>
+              <a:rPr lang="en-US" dirty="0"/>
+              <a:t>            {</a:t>
+            </a:r>
+          </a:p>
+          <a:p>
+            <a:r>
+              <a:rPr lang="en-US" dirty="0"/>
+              <a:t>                if (Lines[</a:t>
+            </a:r>
+            <a:r>
+              <a:rPr lang="en-US" dirty="0" err="1"/>
+              <a:t>i</a:t>
+            </a:r>
+            <a:r>
+              <a:rPr lang="en-US" dirty="0"/>
+              <a:t>].</a:t>
+            </a:r>
+            <a:r>
+              <a:rPr lang="en-US" dirty="0" err="1"/>
+              <a:t>UniqueIdentifier</a:t>
+            </a:r>
+            <a:r>
+              <a:rPr lang="en-US" dirty="0"/>
+              <a:t> == </a:t>
+            </a:r>
+            <a:r>
+              <a:rPr lang="en-US" dirty="0" err="1"/>
+              <a:t>lineID</a:t>
+            </a:r>
+            <a:r>
+              <a:rPr lang="en-US" dirty="0"/>
+              <a:t>)</a:t>
+            </a:r>
+          </a:p>
+          <a:p>
+            <a:r>
+              <a:rPr lang="en-US" dirty="0"/>
+              <a:t>                {</a:t>
+            </a:r>
+          </a:p>
+          <a:p>
+            <a:r>
+              <a:rPr lang="en-US" dirty="0"/>
+              <a:t>                    </a:t>
+            </a:r>
+            <a:r>
+              <a:rPr lang="en-US" dirty="0" err="1"/>
+              <a:t>lineIndex</a:t>
+            </a:r>
+            <a:r>
+              <a:rPr lang="en-US" dirty="0"/>
+              <a:t> = </a:t>
+            </a:r>
+            <a:r>
+              <a:rPr lang="en-US" dirty="0" err="1"/>
+              <a:t>i</a:t>
+            </a:r>
+            <a:r>
+              <a:rPr lang="en-US" dirty="0"/>
+              <a:t>;        </a:t>
+            </a:r>
+          </a:p>
+          <a:p>
+            <a:r>
+              <a:rPr lang="en-US" dirty="0"/>
+              <a:t>                }</a:t>
+            </a:r>
+          </a:p>
+          <a:p>
+            <a:r>
+              <a:rPr lang="en-US" dirty="0"/>
+              <a:t>            }</a:t>
+            </a:r>
+          </a:p>
+          <a:p>
+            <a:endParaRPr lang="en-US" dirty="0"/>
+          </a:p>
+          <a:p>
+            <a:r>
+              <a:rPr lang="en-US" dirty="0"/>
+              <a:t>            if (</a:t>
+            </a:r>
+            <a:r>
+              <a:rPr lang="en-US" dirty="0" err="1"/>
+              <a:t>lineIndex</a:t>
+            </a:r>
+            <a:r>
+              <a:rPr lang="en-US" dirty="0"/>
+              <a:t> &gt; -1)</a:t>
+            </a:r>
+          </a:p>
+          <a:p>
+            <a:r>
+              <a:rPr lang="en-US" dirty="0"/>
+              <a:t>            {</a:t>
+            </a:r>
+          </a:p>
+          <a:p>
+            <a:r>
+              <a:rPr lang="en-US" dirty="0"/>
+              <a:t>                </a:t>
+            </a:r>
+            <a:r>
+              <a:rPr lang="en-US" dirty="0" err="1"/>
+              <a:t>Lines.Remove</a:t>
+            </a:r>
+            <a:r>
+              <a:rPr lang="en-US" dirty="0"/>
+              <a:t>(Lines[</a:t>
+            </a:r>
+            <a:r>
+              <a:rPr lang="en-US" dirty="0" err="1"/>
+              <a:t>lineIndex</a:t>
+            </a:r>
+            <a:r>
+              <a:rPr lang="en-US" dirty="0"/>
+              <a:t>]);</a:t>
+            </a:r>
+          </a:p>
+          <a:p>
+            <a:r>
+              <a:rPr lang="en-US" dirty="0"/>
+              <a:t>            }</a:t>
+            </a:r>
+          </a:p>
+          <a:p>
+            <a:r>
+              <a:rPr lang="en-US" dirty="0"/>
+              <a:t>        }</a:t>
+            </a:r>
+          </a:p>
+        </p:txBody>
+      </p:sp>
+      <p:sp>
+        <p:nvSpPr>
+          <p:cNvPr id="4" name="Slide Number Placeholder 3"/>
+          <p:cNvSpPr>
+            <a:spLocks noGrp="1"/>
+          </p:cNvSpPr>
+          <p:nvPr>
+            <p:ph type="sldNum" sz="quarter" idx="10"/>
+          </p:nvPr>
+        </p:nvSpPr>
+        <p:spPr/>
+        <p:txBody>
+          <a:bodyPr/>
+          <a:lstStyle/>
+          <a:p>
+            <a:fld id="{E58294B0-43FA-4697-A94A-C7D8A3CEE26B}" type="slidenum">
+              <a:rPr lang="en-US" smtClean="0"/>
+              <a:t>21</a:t>
+            </a:fld>
+            <a:endParaRPr lang="en-US"/>
+          </a:p>
+        </p:txBody>
+      </p:sp>
+    </p:spTree>
+    <p:extLst>
+      <p:ext uri="{BB962C8B-B14F-4D97-AF65-F5344CB8AC3E}">
+        <p14:creationId xmlns:p14="http://schemas.microsoft.com/office/powerpoint/2010/main" val="2147581811"/>
+      </p:ext>
+    </p:extLst>
+  </p:cSld>
+  <p:clrMapOvr>
+    <a:masterClrMapping/>
+  </p:clrMapOvr>
+</p:notes>
+</file>
+
 <file path=ppt/slideLayouts/slideLayout1.xml><?xml version="1.0" encoding="utf-8"?>
 <p:sldLayout xmlns:a="http://schemas.openxmlformats.org/drawingml/2006/main" xmlns:r="http://schemas.openxmlformats.org/officeDocument/2006/relationships" xmlns:p="http://schemas.openxmlformats.org/presentationml/2006/main" type="title" preserve="1">
   <p:cSld name="Title Slide">
@@ -1701,7 +2617,7 @@
           <a:p>
             <a:fld id="{1E1327A7-1338-42E3-A376-4DBDA53A9DB0}" type="datetimeFigureOut">
               <a:rPr lang="en-US" smtClean="0"/>
-              <a:t>1/15/19</a:t>
+              <a:t>1/16/19</a:t>
             </a:fld>
             <a:endParaRPr lang="en-US"/>
           </a:p>
@@ -1869,7 +2785,7 @@
           <a:p>
             <a:fld id="{1E1327A7-1338-42E3-A376-4DBDA53A9DB0}" type="datetimeFigureOut">
               <a:rPr lang="en-US" smtClean="0"/>
-              <a:t>1/15/19</a:t>
+              <a:t>1/16/19</a:t>
             </a:fld>
             <a:endParaRPr lang="en-US"/>
           </a:p>
@@ -2047,7 +2963,7 @@
           <a:p>
             <a:fld id="{1E1327A7-1338-42E3-A376-4DBDA53A9DB0}" type="datetimeFigureOut">
               <a:rPr lang="en-US" smtClean="0"/>
-              <a:t>1/15/19</a:t>
+              <a:t>1/16/19</a:t>
             </a:fld>
             <a:endParaRPr lang="en-US"/>
           </a:p>
@@ -2215,7 +3131,7 @@
           <a:p>
             <a:fld id="{1E1327A7-1338-42E3-A376-4DBDA53A9DB0}" type="datetimeFigureOut">
               <a:rPr lang="en-US" smtClean="0"/>
-              <a:t>1/15/19</a:t>
+              <a:t>1/16/19</a:t>
             </a:fld>
             <a:endParaRPr lang="en-US"/>
           </a:p>
@@ -2460,7 +3376,7 @@
           <a:p>
             <a:fld id="{1E1327A7-1338-42E3-A376-4DBDA53A9DB0}" type="datetimeFigureOut">
               <a:rPr lang="en-US" smtClean="0"/>
-              <a:t>1/15/19</a:t>
+              <a:t>1/16/19</a:t>
             </a:fld>
             <a:endParaRPr lang="en-US"/>
           </a:p>
@@ -2689,7 +3605,7 @@
           <a:p>
             <a:fld id="{1E1327A7-1338-42E3-A376-4DBDA53A9DB0}" type="datetimeFigureOut">
               <a:rPr lang="en-US" smtClean="0"/>
-              <a:t>1/15/19</a:t>
+              <a:t>1/16/19</a:t>
             </a:fld>
             <a:endParaRPr lang="en-US"/>
           </a:p>
@@ -3053,7 +3969,7 @@
           <a:p>
             <a:fld id="{1E1327A7-1338-42E3-A376-4DBDA53A9DB0}" type="datetimeFigureOut">
               <a:rPr lang="en-US" smtClean="0"/>
-              <a:t>1/15/19</a:t>
+              <a:t>1/16/19</a:t>
             </a:fld>
             <a:endParaRPr lang="en-US"/>
           </a:p>
@@ -3170,7 +4086,7 @@
           <a:p>
             <a:fld id="{1E1327A7-1338-42E3-A376-4DBDA53A9DB0}" type="datetimeFigureOut">
               <a:rPr lang="en-US" smtClean="0"/>
-              <a:t>1/15/19</a:t>
+              <a:t>1/16/19</a:t>
             </a:fld>
             <a:endParaRPr lang="en-US"/>
           </a:p>
@@ -3265,7 +4181,7 @@
           <a:p>
             <a:fld id="{1E1327A7-1338-42E3-A376-4DBDA53A9DB0}" type="datetimeFigureOut">
               <a:rPr lang="en-US" smtClean="0"/>
-              <a:t>1/15/19</a:t>
+              <a:t>1/16/19</a:t>
             </a:fld>
             <a:endParaRPr lang="en-US"/>
           </a:p>
@@ -3540,7 +4456,7 @@
           <a:p>
             <a:fld id="{1E1327A7-1338-42E3-A376-4DBDA53A9DB0}" type="datetimeFigureOut">
               <a:rPr lang="en-US" smtClean="0"/>
-              <a:t>1/15/19</a:t>
+              <a:t>1/16/19</a:t>
             </a:fld>
             <a:endParaRPr lang="en-US"/>
           </a:p>
@@ -3792,7 +4708,7 @@
           <a:p>
             <a:fld id="{1E1327A7-1338-42E3-A376-4DBDA53A9DB0}" type="datetimeFigureOut">
               <a:rPr lang="en-US" smtClean="0"/>
-              <a:t>1/15/19</a:t>
+              <a:t>1/16/19</a:t>
             </a:fld>
             <a:endParaRPr lang="en-US"/>
           </a:p>
@@ -4003,7 +4919,7 @@
           <a:p>
             <a:fld id="{1E1327A7-1338-42E3-A376-4DBDA53A9DB0}" type="datetimeFigureOut">
               <a:rPr lang="en-US" smtClean="0"/>
-              <a:t>1/15/19</a:t>
+              <a:t>1/16/19</a:t>
             </a:fld>
             <a:endParaRPr lang="en-US"/>
           </a:p>
@@ -12264,13 +13180,8 @@
             </a:pPr>
             <a:r>
               <a:rPr lang="en-US" dirty="0"/>
-              <a:t>Make sure you can build (docker and dotnet core </a:t>
-            </a:r>
-            <a:r>
-              <a:rPr lang="en-US"/>
-              <a:t>2.x)</a:t>
-            </a:r>
-            <a:endParaRPr lang="en-US" dirty="0"/>
+              <a:t>Make sure you can build (docker and dotnet core 2.0)</a:t>
+            </a:r>
           </a:p>
           <a:p>
             <a:pPr marL="0" indent="0">
@@ -12332,8 +13243,13 @@
             </a:pPr>
             <a:r>
               <a:rPr lang="en-US" dirty="0"/>
-              <a:t>Add support to root document for creating a timesheet</a:t>
-            </a:r>
+              <a:t>Add support to root document for creating </a:t>
+            </a:r>
+            <a:r>
+              <a:rPr lang="en-US"/>
+              <a:t>a timesheet</a:t>
+            </a:r>
+            <a:endParaRPr lang="en-US" dirty="0"/>
           </a:p>
         </p:txBody>
       </p:sp>

</xml_diff>